<commit_message>
Showing a single texture (for now)
</commit_message>
<xml_diff>
--- a/6028_Graph_1/D2D/W08-texturing/Texture mapping maddness_Key_Ending_Slide.pptx
+++ b/6028_Graph_1/D2D/W08-texturing/Texture mapping maddness_Key_Ending_Slide.pptx
@@ -3732,8 +3732,8 @@
         </p:nvSpPr>
         <p:spPr>
           <a:xfrm>
-            <a:off x="6705600" y="4171950"/>
-            <a:ext cx="1219200" cy="369332"/>
+            <a:off x="6934200" y="4188279"/>
+            <a:ext cx="1066800" cy="369332"/>
           </a:xfrm>
           <a:prstGeom prst="rect">
             <a:avLst/>
@@ -3814,7 +3814,14 @@
             <a:pPr algn="ctr"/>
             <a:r>
               <a:rPr lang="en-CA" dirty="0"/>
-              <a:t>Taylor Swift Texture in </a:t>
+              <a:t>Dua Lipa</a:t>
+            </a:r>
+          </a:p>
+          <a:p>
+            <a:pPr algn="ctr"/>
+            <a:r>
+              <a:rPr lang="en-CA" dirty="0"/>
+              <a:t>Texture in </a:t>
             </a:r>
             <a:r>
               <a:rPr lang="en-CA" b="1" dirty="0"/>
@@ -4087,7 +4094,7 @@
         </p:nvSpPr>
         <p:spPr>
           <a:xfrm>
-            <a:off x="838200" y="1885950"/>
+            <a:off x="838200" y="2000250"/>
             <a:ext cx="4800600" cy="2308324"/>
           </a:xfrm>
           <a:prstGeom prst="rect">
@@ -7360,9 +7367,18 @@
           <a:p>
             <a:pPr algn="ctr"/>
             <a:r>
-              <a:rPr lang="en-CA" dirty="0"/>
-              <a:t>Sampler1</a:t>
-            </a:r>
+              <a:rPr lang="en-CA" sz="1800" dirty="0">
+                <a:solidFill>
+                  <a:srgbClr val="A31515"/>
+                </a:solidFill>
+                <a:highlight>
+                  <a:srgbClr val="FFFFFF"/>
+                </a:highlight>
+                <a:latin typeface="Cascadia Mono" panose="020B0609020000020004" pitchFamily="49" charset="0"/>
+              </a:rPr>
+              <a:t>texture01</a:t>
+            </a:r>
+            <a:endParaRPr lang="en-CA" dirty="0"/>
           </a:p>
         </p:txBody>
       </p:sp>
@@ -7645,13 +7661,15 @@
           <p:cNvPr id="34" name="Straight Arrow Connector 33"/>
           <p:cNvCxnSpPr>
             <a:cxnSpLocks/>
+            <a:stCxn id="14" idx="1"/>
+            <a:endCxn id="17" idx="3"/>
           </p:cNvCxnSpPr>
           <p:nvPr/>
         </p:nvCxnSpPr>
         <p:spPr>
-          <a:xfrm flipH="1" flipV="1">
-            <a:off x="8097982" y="4397087"/>
-            <a:ext cx="914400" cy="190500"/>
+          <a:xfrm flipH="1">
+            <a:off x="1828800" y="1085850"/>
+            <a:ext cx="609600" cy="533400"/>
           </a:xfrm>
           <a:prstGeom prst="straightConnector1">
             <a:avLst/>
@@ -7686,13 +7704,15 @@
           </p:cNvPr>
           <p:cNvCxnSpPr>
             <a:cxnSpLocks/>
+            <a:stCxn id="31" idx="1"/>
+            <a:endCxn id="29" idx="3"/>
           </p:cNvCxnSpPr>
           <p:nvPr/>
         </p:nvCxnSpPr>
         <p:spPr>
-          <a:xfrm flipV="1">
-            <a:off x="8229600" y="4003964"/>
-            <a:ext cx="651164" cy="742950"/>
+          <a:xfrm flipH="1">
+            <a:off x="4305300" y="1885950"/>
+            <a:ext cx="723900" cy="1343025"/>
           </a:xfrm>
           <a:prstGeom prst="straightConnector1">
             <a:avLst/>
@@ -7728,14 +7748,14 @@
           <p:cNvCxnSpPr>
             <a:cxnSpLocks/>
             <a:stCxn id="12" idx="1"/>
-            <a:endCxn id="15" idx="3"/>
+            <a:endCxn id="14" idx="3"/>
           </p:cNvCxnSpPr>
           <p:nvPr/>
         </p:nvCxnSpPr>
         <p:spPr>
-          <a:xfrm flipH="1">
-            <a:off x="4343400" y="1104900"/>
-            <a:ext cx="685800" cy="666750"/>
+          <a:xfrm flipH="1" flipV="1">
+            <a:off x="4343400" y="1085850"/>
+            <a:ext cx="685800" cy="19050"/>
           </a:xfrm>
           <a:prstGeom prst="straightConnector1">
             <a:avLst/>
@@ -7799,7 +7819,10 @@
           <a:lstStyle/>
           <a:p>
             <a:pPr algn="ctr"/>
-            <a:endParaRPr lang="en-CA" sz="1200" i="1" dirty="0"/>
+            <a:r>
+              <a:rPr lang="en-CA" sz="1200" i="1" dirty="0"/>
+              <a:t>Bad Bunny (13)</a:t>
+            </a:r>
           </a:p>
           <a:p>
             <a:pPr algn="ctr"/>
@@ -8038,15 +8061,15 @@
           </p:cNvPr>
           <p:cNvCxnSpPr>
             <a:cxnSpLocks/>
-            <a:stCxn id="16" idx="1"/>
-            <a:endCxn id="11" idx="3"/>
+            <a:stCxn id="29" idx="1"/>
+            <a:endCxn id="10" idx="3"/>
           </p:cNvCxnSpPr>
           <p:nvPr/>
         </p:nvCxnSpPr>
         <p:spPr>
           <a:xfrm flipH="1">
-            <a:off x="1787236" y="2457450"/>
-            <a:ext cx="651164" cy="1847850"/>
+            <a:off x="1787236" y="3228975"/>
+            <a:ext cx="613064" cy="146339"/>
           </a:xfrm>
           <a:prstGeom prst="straightConnector1">
             <a:avLst/>

</xml_diff>

<commit_message>
Push that should have happend on Wednesday
</commit_message>
<xml_diff>
--- a/6028_Graph_1/D2D/W08-texturing/Texture mapping maddness_Key_Ending_Slide.pptx
+++ b/6028_Graph_1/D2D/W08-texturing/Texture mapping maddness_Key_Ending_Slide.pptx
@@ -228,7 +228,7 @@
             <a:fld id="{6E28E25E-87BB-46EA-8F9E-473DAE89420C}" type="datetimeFigureOut">
               <a:rPr lang="en-CA" smtClean="0"/>
               <a:pPr/>
-              <a:t>2024-10-31</a:t>
+              <a:t>2024-11-06</a:t>
             </a:fld>
             <a:endParaRPr lang="en-CA"/>
           </a:p>
@@ -494,7 +494,7 @@
             <a:fld id="{667A62CB-8588-4D98-8E9E-C665A03A0EA4}" type="datetimeFigureOut">
               <a:rPr lang="en-CA" smtClean="0"/>
               <a:pPr/>
-              <a:t>2024-10-31</a:t>
+              <a:t>2024-11-06</a:t>
             </a:fld>
             <a:endParaRPr lang="en-CA"/>
           </a:p>
@@ -661,7 +661,7 @@
             <a:fld id="{667A62CB-8588-4D98-8E9E-C665A03A0EA4}" type="datetimeFigureOut">
               <a:rPr lang="en-CA" smtClean="0"/>
               <a:pPr/>
-              <a:t>2024-10-31</a:t>
+              <a:t>2024-11-06</a:t>
             </a:fld>
             <a:endParaRPr lang="en-CA"/>
           </a:p>
@@ -838,7 +838,7 @@
             <a:fld id="{667A62CB-8588-4D98-8E9E-C665A03A0EA4}" type="datetimeFigureOut">
               <a:rPr lang="en-CA" smtClean="0"/>
               <a:pPr/>
-              <a:t>2024-10-31</a:t>
+              <a:t>2024-11-06</a:t>
             </a:fld>
             <a:endParaRPr lang="en-CA"/>
           </a:p>
@@ -1005,7 +1005,7 @@
             <a:fld id="{667A62CB-8588-4D98-8E9E-C665A03A0EA4}" type="datetimeFigureOut">
               <a:rPr lang="en-CA" smtClean="0"/>
               <a:pPr/>
-              <a:t>2024-10-31</a:t>
+              <a:t>2024-11-06</a:t>
             </a:fld>
             <a:endParaRPr lang="en-CA"/>
           </a:p>
@@ -1248,7 +1248,7 @@
             <a:fld id="{667A62CB-8588-4D98-8E9E-C665A03A0EA4}" type="datetimeFigureOut">
               <a:rPr lang="en-CA" smtClean="0"/>
               <a:pPr/>
-              <a:t>2024-10-31</a:t>
+              <a:t>2024-11-06</a:t>
             </a:fld>
             <a:endParaRPr lang="en-CA"/>
           </a:p>
@@ -1533,7 +1533,7 @@
             <a:fld id="{667A62CB-8588-4D98-8E9E-C665A03A0EA4}" type="datetimeFigureOut">
               <a:rPr lang="en-CA" smtClean="0"/>
               <a:pPr/>
-              <a:t>2024-10-31</a:t>
+              <a:t>2024-11-06</a:t>
             </a:fld>
             <a:endParaRPr lang="en-CA"/>
           </a:p>
@@ -1952,7 +1952,7 @@
             <a:fld id="{667A62CB-8588-4D98-8E9E-C665A03A0EA4}" type="datetimeFigureOut">
               <a:rPr lang="en-CA" smtClean="0"/>
               <a:pPr/>
-              <a:t>2024-10-31</a:t>
+              <a:t>2024-11-06</a:t>
             </a:fld>
             <a:endParaRPr lang="en-CA"/>
           </a:p>
@@ -2067,7 +2067,7 @@
             <a:fld id="{667A62CB-8588-4D98-8E9E-C665A03A0EA4}" type="datetimeFigureOut">
               <a:rPr lang="en-CA" smtClean="0"/>
               <a:pPr/>
-              <a:t>2024-10-31</a:t>
+              <a:t>2024-11-06</a:t>
             </a:fld>
             <a:endParaRPr lang="en-CA"/>
           </a:p>
@@ -2159,7 +2159,7 @@
             <a:fld id="{667A62CB-8588-4D98-8E9E-C665A03A0EA4}" type="datetimeFigureOut">
               <a:rPr lang="en-CA" smtClean="0"/>
               <a:pPr/>
-              <a:t>2024-10-31</a:t>
+              <a:t>2024-11-06</a:t>
             </a:fld>
             <a:endParaRPr lang="en-CA"/>
           </a:p>
@@ -2433,7 +2433,7 @@
             <a:fld id="{667A62CB-8588-4D98-8E9E-C665A03A0EA4}" type="datetimeFigureOut">
               <a:rPr lang="en-CA" smtClean="0"/>
               <a:pPr/>
-              <a:t>2024-10-31</a:t>
+              <a:t>2024-11-06</a:t>
             </a:fld>
             <a:endParaRPr lang="en-CA"/>
           </a:p>
@@ -2683,7 +2683,7 @@
             <a:fld id="{667A62CB-8588-4D98-8E9E-C665A03A0EA4}" type="datetimeFigureOut">
               <a:rPr lang="en-CA" smtClean="0"/>
               <a:pPr/>
-              <a:t>2024-10-31</a:t>
+              <a:t>2024-11-06</a:t>
             </a:fld>
             <a:endParaRPr lang="en-CA"/>
           </a:p>
@@ -2893,7 +2893,7 @@
             <a:fld id="{667A62CB-8588-4D98-8E9E-C665A03A0EA4}" type="datetimeFigureOut">
               <a:rPr lang="en-CA" smtClean="0"/>
               <a:pPr/>
-              <a:t>2024-10-31</a:t>
+              <a:t>2024-11-06</a:t>
             </a:fld>
             <a:endParaRPr lang="en-CA"/>
           </a:p>
@@ -7624,15 +7624,15 @@
           <p:cNvPr id="28" name="Straight Arrow Connector 27"/>
           <p:cNvCxnSpPr>
             <a:cxnSpLocks/>
-            <a:stCxn id="15" idx="1"/>
-            <a:endCxn id="9" idx="3"/>
+            <a:stCxn id="16" idx="1"/>
+            <a:endCxn id="22" idx="3"/>
           </p:cNvCxnSpPr>
           <p:nvPr/>
         </p:nvCxnSpPr>
         <p:spPr>
-          <a:xfrm flipH="1" flipV="1">
-            <a:off x="1828800" y="723900"/>
-            <a:ext cx="609600" cy="1047750"/>
+          <a:xfrm flipH="1">
+            <a:off x="1787236" y="2457450"/>
+            <a:ext cx="651164" cy="57150"/>
           </a:xfrm>
           <a:prstGeom prst="straightConnector1">
             <a:avLst/>
@@ -11129,7 +11129,7 @@
         </p:nvSpPr>
         <p:spPr>
           <a:xfrm>
-            <a:off x="0" y="3829050"/>
+            <a:off x="-152400" y="3911600"/>
             <a:ext cx="838200" cy="488950"/>
           </a:xfrm>
           <a:prstGeom prst="ellipse">
@@ -11258,7 +11258,7 @@
         </p:nvSpPr>
         <p:spPr>
           <a:xfrm>
-            <a:off x="0" y="1371600"/>
+            <a:off x="-114301" y="1314452"/>
             <a:ext cx="838200" cy="488950"/>
           </a:xfrm>
           <a:prstGeom prst="ellipse">

</xml_diff>